<commit_message>
Screenshots and PPT work
</commit_message>
<xml_diff>
--- a/FBLAAPPPPT.pptx
+++ b/FBLAAPPPPT.pptx
@@ -9,13 +9,13 @@
     <p:sldId id="256" r:id="rId3"/>
     <p:sldId id="257" r:id="rId4"/>
     <p:sldId id="258" r:id="rId5"/>
-    <p:sldId id="268" r:id="rId6"/>
-    <p:sldId id="260" r:id="rId7"/>
-    <p:sldId id="259" r:id="rId8"/>
-    <p:sldId id="266" r:id="rId9"/>
-    <p:sldId id="261" r:id="rId10"/>
-    <p:sldId id="262" r:id="rId11"/>
-    <p:sldId id="263" r:id="rId12"/>
+    <p:sldId id="269" r:id="rId6"/>
+    <p:sldId id="268" r:id="rId7"/>
+    <p:sldId id="260" r:id="rId8"/>
+    <p:sldId id="259" r:id="rId9"/>
+    <p:sldId id="266" r:id="rId10"/>
+    <p:sldId id="261" r:id="rId11"/>
+    <p:sldId id="262" r:id="rId12"/>
     <p:sldId id="264" r:id="rId13"/>
     <p:sldId id="267" r:id="rId14"/>
   </p:sldIdLst>
@@ -118,7 +118,18 @@
   </p:defaultTextStyle>
   <p:extLst>
     <p:ext uri="{EFAFB233-063F-42B5-8137-9DF3F51BA10A}">
-      <p15:sldGuideLst xmlns:p15="http://schemas.microsoft.com/office/powerpoint/2012/main"/>
+      <p15:sldGuideLst xmlns:p15="http://schemas.microsoft.com/office/powerpoint/2012/main">
+        <p15:guide id="1" orient="horz" pos="2160" userDrawn="1">
+          <p15:clr>
+            <a:srgbClr val="A4A3A4"/>
+          </p15:clr>
+        </p15:guide>
+        <p15:guide id="2" pos="3840" userDrawn="1">
+          <p15:clr>
+            <a:srgbClr val="A4A3A4"/>
+          </p15:clr>
+        </p15:guide>
+      </p15:sldGuideLst>
     </p:ext>
   </p:extLst>
 </p:presentation>
@@ -3316,7 +3327,7 @@
           <a:p>
             <a:fld id="{48A87A34-81AB-432B-8DAE-1953F412C126}" type="datetimeFigureOut">
               <a:rPr lang="en-US" dirty="0"/>
-              <a:t>3/24/2015</a:t>
+              <a:t>4/1/2015</a:t>
             </a:fld>
             <a:endParaRPr lang="en-US" dirty="0"/>
           </a:p>
@@ -3824,7 +3835,7 @@
           <a:p>
             <a:fld id="{48A87A34-81AB-432B-8DAE-1953F412C126}" type="datetimeFigureOut">
               <a:rPr lang="en-US" dirty="0"/>
-              <a:t>3/24/2015</a:t>
+              <a:t>4/1/2015</a:t>
             </a:fld>
             <a:endParaRPr lang="en-US" dirty="0"/>
           </a:p>
@@ -4060,7 +4071,7 @@
             <a:fld id="{48A87A34-81AB-432B-8DAE-1953F412C126}" type="datetimeFigureOut">
               <a:rPr lang="en-US" dirty="0"/>
               <a:pPr/>
-              <a:t>3/24/2015</a:t>
+              <a:t>4/1/2015</a:t>
             </a:fld>
             <a:endParaRPr lang="en-US" dirty="0"/>
           </a:p>
@@ -4346,7 +4357,7 @@
             <a:fld id="{48A87A34-81AB-432B-8DAE-1953F412C126}" type="datetimeFigureOut">
               <a:rPr lang="en-US" dirty="0"/>
               <a:pPr/>
-              <a:t>3/24/2015</a:t>
+              <a:t>4/1/2015</a:t>
             </a:fld>
             <a:endParaRPr lang="en-US" dirty="0"/>
           </a:p>
@@ -5079,7 +5090,7 @@
             <a:fld id="{48A87A34-81AB-432B-8DAE-1953F412C126}" type="datetimeFigureOut">
               <a:rPr lang="en-US" dirty="0"/>
               <a:pPr/>
-              <a:t>3/24/2015</a:t>
+              <a:t>4/1/2015</a:t>
             </a:fld>
             <a:endParaRPr lang="en-US" dirty="0"/>
           </a:p>
@@ -5636,7 +5647,7 @@
           <a:p>
             <a:fld id="{48A87A34-81AB-432B-8DAE-1953F412C126}" type="datetimeFigureOut">
               <a:rPr lang="en-US" dirty="0"/>
-              <a:t>3/24/2015</a:t>
+              <a:t>4/1/2015</a:t>
             </a:fld>
             <a:endParaRPr lang="en-US" dirty="0"/>
           </a:p>
@@ -6420,7 +6431,7 @@
           <a:p>
             <a:fld id="{48A87A34-81AB-432B-8DAE-1953F412C126}" type="datetimeFigureOut">
               <a:rPr lang="en-US" dirty="0"/>
-              <a:t>3/24/2015</a:t>
+              <a:t>4/1/2015</a:t>
             </a:fld>
             <a:endParaRPr lang="en-US" dirty="0"/>
           </a:p>
@@ -6605,7 +6616,7 @@
           <a:p>
             <a:fld id="{48A87A34-81AB-432B-8DAE-1953F412C126}" type="datetimeFigureOut">
               <a:rPr lang="en-US" dirty="0"/>
-              <a:t>3/24/2015</a:t>
+              <a:t>4/1/2015</a:t>
             </a:fld>
             <a:endParaRPr lang="en-US" dirty="0"/>
           </a:p>
@@ -6834,7 +6845,7 @@
             <a:fld id="{48A87A34-81AB-432B-8DAE-1953F412C126}" type="datetimeFigureOut">
               <a:rPr lang="en-US" dirty="0"/>
               <a:pPr/>
-              <a:t>3/24/2015</a:t>
+              <a:t>4/1/2015</a:t>
             </a:fld>
             <a:endParaRPr lang="en-US" dirty="0"/>
           </a:p>
@@ -7024,7 +7035,7 @@
           <a:p>
             <a:fld id="{48A87A34-81AB-432B-8DAE-1953F412C126}" type="datetimeFigureOut">
               <a:rPr lang="en-US" dirty="0"/>
-              <a:t>3/24/2015</a:t>
+              <a:t>4/1/2015</a:t>
             </a:fld>
             <a:endParaRPr lang="en-US" dirty="0"/>
           </a:p>
@@ -7604,7 +7615,7 @@
           <a:p>
             <a:fld id="{48A87A34-81AB-432B-8DAE-1953F412C126}" type="datetimeFigureOut">
               <a:rPr lang="en-US" dirty="0"/>
-              <a:t>3/24/2015</a:t>
+              <a:t>4/1/2015</a:t>
             </a:fld>
             <a:endParaRPr lang="en-US" dirty="0"/>
           </a:p>
@@ -7993,7 +8004,7 @@
           <a:p>
             <a:fld id="{48A87A34-81AB-432B-8DAE-1953F412C126}" type="datetimeFigureOut">
               <a:rPr lang="en-US" dirty="0"/>
-              <a:t>3/24/2015</a:t>
+              <a:t>4/1/2015</a:t>
             </a:fld>
             <a:endParaRPr lang="en-US" dirty="0"/>
           </a:p>
@@ -8121,7 +8132,7 @@
           <a:p>
             <a:fld id="{48A87A34-81AB-432B-8DAE-1953F412C126}" type="datetimeFigureOut">
               <a:rPr lang="en-US" dirty="0"/>
-              <a:t>3/24/2015</a:t>
+              <a:t>4/1/2015</a:t>
             </a:fld>
             <a:endParaRPr lang="en-US" dirty="0"/>
           </a:p>
@@ -8226,7 +8237,7 @@
           <a:p>
             <a:fld id="{48A87A34-81AB-432B-8DAE-1953F412C126}" type="datetimeFigureOut">
               <a:rPr lang="en-US" dirty="0"/>
-              <a:t>3/24/2015</a:t>
+              <a:t>4/1/2015</a:t>
             </a:fld>
             <a:endParaRPr lang="en-US" dirty="0"/>
           </a:p>
@@ -8485,7 +8496,7 @@
           <a:p>
             <a:fld id="{48A87A34-81AB-432B-8DAE-1953F412C126}" type="datetimeFigureOut">
               <a:rPr lang="en-US" dirty="0"/>
-              <a:t>3/24/2015</a:t>
+              <a:t>4/1/2015</a:t>
             </a:fld>
             <a:endParaRPr lang="en-US" dirty="0"/>
           </a:p>
@@ -8752,7 +8763,7 @@
           <a:p>
             <a:fld id="{48A87A34-81AB-432B-8DAE-1953F412C126}" type="datetimeFigureOut">
               <a:rPr lang="en-US" dirty="0"/>
-              <a:t>3/24/2015</a:t>
+              <a:t>4/1/2015</a:t>
             </a:fld>
             <a:endParaRPr lang="en-US" dirty="0"/>
           </a:p>
@@ -9468,7 +9479,7 @@
 </file>
 
 <file path=ppt/slides/slide10.xml><?xml version="1.0" encoding="utf-8"?>
-<p:sld xmlns:a="http://schemas.openxmlformats.org/drawingml/2006/main" xmlns:r="http://schemas.openxmlformats.org/officeDocument/2006/relationships" xmlns:p="http://schemas.openxmlformats.org/presentationml/2006/main" show="0">
+<p:sld xmlns:a="http://schemas.openxmlformats.org/drawingml/2006/main" xmlns:r="http://schemas.openxmlformats.org/officeDocument/2006/relationships" xmlns:p="http://schemas.openxmlformats.org/presentationml/2006/main">
   <p:cSld>
     <p:spTree>
       <p:nvGrpSpPr>
@@ -9491,7 +9502,7 @@
             <a:spLocks noGrp="1"/>
           </p:cNvSpPr>
           <p:nvPr>
-            <p:ph type="title"/>
+            <p:ph type="ctrTitle"/>
           </p:nvPr>
         </p:nvSpPr>
         <p:spPr/>
@@ -9501,7 +9512,7 @@
           <a:p>
             <a:r>
               <a:rPr lang="en-US" dirty="0" smtClean="0"/>
-              <a:t>Video demo</a:t>
+              <a:t>Live Demo</a:t>
             </a:r>
             <a:endParaRPr lang="en-US" dirty="0"/>
           </a:p>
@@ -9509,12 +9520,12 @@
       </p:sp>
       <p:sp>
         <p:nvSpPr>
-          <p:cNvPr id="3" name="Content Placeholder 2"/>
+          <p:cNvPr id="3" name="Subtitle 2"/>
           <p:cNvSpPr>
             <a:spLocks noGrp="1"/>
           </p:cNvSpPr>
           <p:nvPr>
-            <p:ph idx="1"/>
+            <p:ph type="subTitle" idx="1"/>
           </p:nvPr>
         </p:nvSpPr>
         <p:spPr/>
@@ -9524,26 +9535,198 @@
           <a:p>
             <a:r>
               <a:rPr lang="en-US" dirty="0" smtClean="0"/>
-              <a:t>Do a video demo on this slide</a:t>
+              <a:t>Please wait a few seconds while we switch the projector to the phone…</a:t>
             </a:r>
             <a:endParaRPr lang="en-US" dirty="0"/>
           </a:p>
         </p:txBody>
       </p:sp>
+      <p:grpSp>
+        <p:nvGrpSpPr>
+          <p:cNvPr id="5" name="Group 4"/>
+          <p:cNvGrpSpPr/>
+          <p:nvPr/>
+        </p:nvGrpSpPr>
+        <p:grpSpPr>
+          <a:xfrm>
+            <a:off x="1371600" y="5889523"/>
+            <a:ext cx="943897" cy="968477"/>
+            <a:chOff x="1371600" y="5889523"/>
+            <a:chExt cx="943897" cy="968477"/>
+          </a:xfrm>
+        </p:grpSpPr>
+        <p:sp>
+          <p:nvSpPr>
+            <p:cNvPr id="4" name="Round Same Side Corner Rectangle 3"/>
+            <p:cNvSpPr/>
+            <p:nvPr/>
+          </p:nvSpPr>
+          <p:spPr>
+            <a:xfrm>
+              <a:off x="1371600" y="5889523"/>
+              <a:ext cx="943897" cy="968477"/>
+            </a:xfrm>
+            <a:prstGeom prst="round2SameRect">
+              <a:avLst/>
+            </a:prstGeom>
+            <a:solidFill>
+              <a:srgbClr val="FFFFFF">
+                <a:alpha val="70980"/>
+              </a:srgbClr>
+            </a:solidFill>
+            <a:ln>
+              <a:solidFill>
+                <a:schemeClr val="bg1"/>
+              </a:solidFill>
+            </a:ln>
+          </p:spPr>
+          <p:style>
+            <a:lnRef idx="2">
+              <a:schemeClr val="accent1">
+                <a:shade val="50000"/>
+              </a:schemeClr>
+            </a:lnRef>
+            <a:fillRef idx="1">
+              <a:schemeClr val="accent1"/>
+            </a:fillRef>
+            <a:effectRef idx="0">
+              <a:schemeClr val="accent1"/>
+            </a:effectRef>
+            <a:fontRef idx="minor">
+              <a:schemeClr val="lt1"/>
+            </a:fontRef>
+          </p:style>
+          <p:txBody>
+            <a:bodyPr rtlCol="0" anchor="ctr"/>
+            <a:lstStyle/>
+            <a:p>
+              <a:pPr algn="ctr"/>
+              <a:endParaRPr lang="en-US"/>
+            </a:p>
+          </p:txBody>
+        </p:sp>
+        <p:grpSp>
+          <p:nvGrpSpPr>
+            <p:cNvPr id="11" name="Group 10"/>
+            <p:cNvGrpSpPr/>
+            <p:nvPr/>
+          </p:nvGrpSpPr>
+          <p:grpSpPr>
+            <a:xfrm>
+              <a:off x="1475143" y="6046521"/>
+              <a:ext cx="741816" cy="687605"/>
+              <a:chOff x="2801484" y="5197261"/>
+              <a:chExt cx="741816" cy="687605"/>
+            </a:xfrm>
+          </p:grpSpPr>
+          <p:sp>
+            <p:nvSpPr>
+              <p:cNvPr id="10" name="Rounded Rectangle 9"/>
+              <p:cNvSpPr/>
+              <p:nvPr/>
+            </p:nvSpPr>
+            <p:spPr>
+              <a:xfrm>
+                <a:off x="2801484" y="5197261"/>
+                <a:ext cx="741816" cy="687605"/>
+              </a:xfrm>
+              <a:prstGeom prst="roundRect">
+                <a:avLst/>
+              </a:prstGeom>
+            </p:spPr>
+            <p:style>
+              <a:lnRef idx="2">
+                <a:schemeClr val="accent1">
+                  <a:shade val="50000"/>
+                </a:schemeClr>
+              </a:lnRef>
+              <a:fillRef idx="1">
+                <a:schemeClr val="accent1"/>
+              </a:fillRef>
+              <a:effectRef idx="0">
+                <a:schemeClr val="accent1"/>
+              </a:effectRef>
+              <a:fontRef idx="minor">
+                <a:schemeClr val="lt1"/>
+              </a:fontRef>
+            </p:style>
+            <p:txBody>
+              <a:bodyPr rtlCol="0" anchor="ctr"/>
+              <a:lstStyle/>
+              <a:p>
+                <a:pPr algn="ctr"/>
+                <a:endParaRPr lang="en-US"/>
+              </a:p>
+            </p:txBody>
+          </p:sp>
+          <p:sp>
+            <p:nvSpPr>
+              <p:cNvPr id="9" name="Action Button: Movie 8">
+                <a:hlinkClick r:id="rId2" action="ppaction://hlinksldjump" highlightClick="1"/>
+              </p:cNvPr>
+              <p:cNvSpPr/>
+              <p:nvPr/>
+            </p:nvSpPr>
+            <p:spPr>
+              <a:xfrm>
+                <a:off x="2801485" y="5197261"/>
+                <a:ext cx="741815" cy="687605"/>
+              </a:xfrm>
+              <a:prstGeom prst="actionButtonMovie">
+                <a:avLst/>
+              </a:prstGeom>
+              <a:solidFill>
+                <a:srgbClr val="B2B2B2">
+                  <a:alpha val="20000"/>
+                </a:srgbClr>
+              </a:solidFill>
+              <a:ln>
+                <a:solidFill>
+                  <a:srgbClr val="FFFFFF"/>
+                </a:solidFill>
+              </a:ln>
+            </p:spPr>
+            <p:style>
+              <a:lnRef idx="2">
+                <a:schemeClr val="accent1">
+                  <a:shade val="50000"/>
+                </a:schemeClr>
+              </a:lnRef>
+              <a:fillRef idx="1">
+                <a:schemeClr val="accent1"/>
+              </a:fillRef>
+              <a:effectRef idx="0">
+                <a:schemeClr val="accent1"/>
+              </a:effectRef>
+              <a:fontRef idx="minor">
+                <a:schemeClr val="lt1"/>
+              </a:fontRef>
+            </p:style>
+            <p:txBody>
+              <a:bodyPr rtlCol="0" anchor="ctr"/>
+              <a:lstStyle/>
+              <a:p>
+                <a:pPr algn="ctr"/>
+                <a:endParaRPr lang="en-US"/>
+              </a:p>
+            </p:txBody>
+          </p:sp>
+        </p:grpSp>
+      </p:grpSp>
     </p:spTree>
     <p:extLst>
       <p:ext uri="{BB962C8B-B14F-4D97-AF65-F5344CB8AC3E}">
-        <p14:creationId xmlns:p14="http://schemas.microsoft.com/office/powerpoint/2010/main" val="354447307"/>
+        <p14:creationId xmlns:p14="http://schemas.microsoft.com/office/powerpoint/2010/main" val="1882097811"/>
       </p:ext>
     </p:extLst>
   </p:cSld>
   <p:clrMapOvr>
     <a:masterClrMapping/>
   </p:clrMapOvr>
-  <mc:AlternateContent xmlns:mc="http://schemas.openxmlformats.org/markup-compatibility/2006" xmlns:p15="http://schemas.microsoft.com/office/powerpoint/2012/main">
-    <mc:Choice Requires="p15">
-      <p:transition xmlns:p14="http://schemas.microsoft.com/office/powerpoint/2010/main" spd="slow" p14:dur="2000">
-        <p15:prstTrans prst="drape"/>
+  <mc:AlternateContent xmlns:mc="http://schemas.openxmlformats.org/markup-compatibility/2006" xmlns:p14="http://schemas.microsoft.com/office/powerpoint/2010/main">
+    <mc:Choice Requires="p14">
+      <p:transition spd="slow" p14:dur="1500">
+        <p14:reveal/>
       </p:transition>
     </mc:Choice>
     <mc:Fallback xmlns="">
@@ -9563,7 +9746,7 @@
 </file>
 
 <file path=ppt/slides/slide11.xml><?xml version="1.0" encoding="utf-8"?>
-<p:sld xmlns:a="http://schemas.openxmlformats.org/drawingml/2006/main" xmlns:r="http://schemas.openxmlformats.org/officeDocument/2006/relationships" xmlns:p="http://schemas.openxmlformats.org/presentationml/2006/main">
+<p:sld xmlns:a="http://schemas.openxmlformats.org/drawingml/2006/main" xmlns:r="http://schemas.openxmlformats.org/officeDocument/2006/relationships" xmlns:p="http://schemas.openxmlformats.org/presentationml/2006/main" show="0">
   <p:cSld>
     <p:spTree>
       <p:nvGrpSpPr>
@@ -9581,12 +9764,12 @@
       </p:grpSpPr>
       <p:sp>
         <p:nvSpPr>
-          <p:cNvPr id="4" name="Title 3"/>
+          <p:cNvPr id="2" name="Title 1"/>
           <p:cNvSpPr>
             <a:spLocks noGrp="1"/>
           </p:cNvSpPr>
           <p:nvPr>
-            <p:ph type="ctrTitle"/>
+            <p:ph type="title"/>
           </p:nvPr>
         </p:nvSpPr>
         <p:spPr/>
@@ -9596,7 +9779,7 @@
           <a:p>
             <a:r>
               <a:rPr lang="en-US" dirty="0" smtClean="0"/>
-              <a:t>Thank you very much</a:t>
+              <a:t>Video demo</a:t>
             </a:r>
             <a:endParaRPr lang="en-US" dirty="0"/>
           </a:p>
@@ -9604,12 +9787,12 @@
       </p:sp>
       <p:sp>
         <p:nvSpPr>
-          <p:cNvPr id="5" name="Subtitle 4"/>
+          <p:cNvPr id="3" name="Content Placeholder 2"/>
           <p:cNvSpPr>
             <a:spLocks noGrp="1"/>
           </p:cNvSpPr>
           <p:nvPr>
-            <p:ph type="subTitle" idx="1"/>
+            <p:ph idx="1"/>
           </p:nvPr>
         </p:nvSpPr>
         <p:spPr/>
@@ -9624,17 +9807,17 @@
     </p:spTree>
     <p:extLst>
       <p:ext uri="{BB962C8B-B14F-4D97-AF65-F5344CB8AC3E}">
-        <p14:creationId xmlns:p14="http://schemas.microsoft.com/office/powerpoint/2010/main" val="446047573"/>
+        <p14:creationId xmlns:p14="http://schemas.microsoft.com/office/powerpoint/2010/main" val="354447307"/>
       </p:ext>
     </p:extLst>
   </p:cSld>
   <p:clrMapOvr>
     <a:masterClrMapping/>
   </p:clrMapOvr>
-  <mc:AlternateContent xmlns:mc="http://schemas.openxmlformats.org/markup-compatibility/2006" xmlns:p14="http://schemas.microsoft.com/office/powerpoint/2010/main">
-    <mc:Choice Requires="p14">
-      <p:transition spd="slow" p14:dur="1400">
-        <p14:doors dir="vert"/>
+  <mc:AlternateContent xmlns:mc="http://schemas.openxmlformats.org/markup-compatibility/2006" xmlns:p15="http://schemas.microsoft.com/office/powerpoint/2012/main">
+    <mc:Choice Requires="p15">
+      <p:transition xmlns:p14="http://schemas.microsoft.com/office/powerpoint/2010/main" spd="slow" p14:dur="2000">
+        <p15:prstTrans prst="drape"/>
       </p:transition>
     </mc:Choice>
     <mc:Fallback xmlns="">
@@ -9940,25 +10123,281 @@
           </a:p>
         </p:txBody>
       </p:sp>
-      <p:sp>
-        <p:nvSpPr>
-          <p:cNvPr id="3" name="Content Placeholder 2"/>
-          <p:cNvSpPr>
-            <a:spLocks noGrp="1"/>
-          </p:cNvSpPr>
-          <p:nvPr>
-            <p:ph idx="1"/>
-          </p:nvPr>
-        </p:nvSpPr>
-        <p:spPr/>
-        <p:txBody>
-          <a:bodyPr/>
-          <a:lstStyle/>
-          <a:p>
-            <a:endParaRPr lang="en-US" dirty="0"/>
-          </a:p>
-        </p:txBody>
-      </p:sp>
+      <p:grpSp>
+        <p:nvGrpSpPr>
+          <p:cNvPr id="4" name="Group 3"/>
+          <p:cNvGrpSpPr/>
+          <p:nvPr/>
+        </p:nvGrpSpPr>
+        <p:grpSpPr>
+          <a:xfrm>
+            <a:off x="2895600" y="1632156"/>
+            <a:ext cx="8554623" cy="1973728"/>
+            <a:chOff x="11062129" y="1178969"/>
+            <a:chExt cx="5249648" cy="1211202"/>
+          </a:xfrm>
+        </p:grpSpPr>
+        <p:pic>
+          <p:nvPicPr>
+            <p:cNvPr id="5" name="Picture 2" descr="https://fbcdn-profile-a.akamaihd.net/hprofile-ak-xfa1/v/t1.0-1/p320x320/10438557_392459417574073_8020700183090881959_n.jpg?oh=3e0b4fe51b39309b376778260a873bc8&amp;oe=55B607A4&amp;__gda__=1433900077_fc05d5f6525cf149fc5477132b3592df"/>
+            <p:cNvPicPr>
+              <a:picLocks noChangeAspect="1" noChangeArrowheads="1"/>
+            </p:cNvPicPr>
+            <p:nvPr/>
+          </p:nvPicPr>
+          <p:blipFill>
+            <a:blip r:embed="rId2">
+              <a:extLst>
+                <a:ext uri="{28A0092B-C50C-407E-A947-70E740481C1C}">
+                  <a14:useLocalDpi xmlns:a14="http://schemas.microsoft.com/office/drawing/2010/main" val="0"/>
+                </a:ext>
+              </a:extLst>
+            </a:blip>
+            <a:srcRect/>
+            <a:stretch>
+              <a:fillRect/>
+            </a:stretch>
+          </p:blipFill>
+          <p:spPr bwMode="auto">
+            <a:xfrm>
+              <a:off x="11062129" y="1238785"/>
+              <a:ext cx="1151385" cy="1151386"/>
+            </a:xfrm>
+            <a:prstGeom prst="rect">
+              <a:avLst/>
+            </a:prstGeom>
+            <a:noFill/>
+            <a:extLst>
+              <a:ext uri="{909E8E84-426E-40DD-AFC4-6F175D3DCCD1}">
+                <a14:hiddenFill xmlns:a14="http://schemas.microsoft.com/office/drawing/2010/main">
+                  <a:solidFill>
+                    <a:srgbClr val="FFFFFF"/>
+                  </a:solidFill>
+                </a14:hiddenFill>
+              </a:ext>
+            </a:extLst>
+          </p:spPr>
+        </p:pic>
+        <p:sp>
+          <p:nvSpPr>
+            <p:cNvPr id="6" name="TextBox 5"/>
+            <p:cNvSpPr txBox="1"/>
+            <p:nvPr/>
+          </p:nvSpPr>
+          <p:spPr>
+            <a:xfrm>
+              <a:off x="12374478" y="1178969"/>
+              <a:ext cx="3937299" cy="925467"/>
+            </a:xfrm>
+            <a:prstGeom prst="rect">
+              <a:avLst/>
+            </a:prstGeom>
+            <a:noFill/>
+          </p:spPr>
+          <p:txBody>
+            <a:bodyPr wrap="square" rtlCol="0">
+              <a:spAutoFit/>
+            </a:bodyPr>
+            <a:lstStyle/>
+            <a:p>
+              <a:r>
+                <a:rPr lang="en-US" sz="2800" dirty="0" smtClean="0">
+                  <a:effectLst>
+                    <a:outerShdw blurRad="38100" dist="38100" dir="2700000" algn="tl">
+                      <a:srgbClr val="000000">
+                        <a:alpha val="43137"/>
+                      </a:srgbClr>
+                    </a:outerShdw>
+                  </a:effectLst>
+                </a:rPr>
+                <a:t>Andrew Katz</a:t>
+              </a:r>
+            </a:p>
+            <a:p>
+              <a:r>
+                <a:rPr lang="en-US" sz="1600" b="1" dirty="0" smtClean="0"/>
+                <a:t>Lead Developer</a:t>
+              </a:r>
+              <a:endParaRPr lang="en-US" sz="1600" b="1" dirty="0" smtClean="0"/>
+            </a:p>
+            <a:p>
+              <a:r>
+                <a:rPr lang="en-US" sz="1600" dirty="0" smtClean="0"/>
+                <a:t>10</a:t>
+              </a:r>
+              <a:r>
+                <a:rPr lang="en-US" sz="1600" baseline="30000" dirty="0" smtClean="0"/>
+                <a:t>th</a:t>
+              </a:r>
+              <a:r>
+                <a:rPr lang="en-US" sz="1600" dirty="0" smtClean="0"/>
+                <a:t> Grade Student</a:t>
+              </a:r>
+            </a:p>
+            <a:p>
+              <a:r>
+                <a:rPr lang="en-US" sz="1600" dirty="0" smtClean="0"/>
+                <a:t>Mamaroneck </a:t>
+              </a:r>
+              <a:r>
+                <a:rPr lang="en-US" sz="1600" dirty="0" smtClean="0"/>
+                <a:t>High School</a:t>
+              </a:r>
+            </a:p>
+            <a:p>
+              <a:r>
+                <a:rPr lang="en-US" sz="1600" dirty="0" smtClean="0">
+                  <a:hlinkClick r:id="rId3"/>
+                </a:rPr>
+                <a:t>aakatz3@gmail.com</a:t>
+              </a:r>
+              <a:endParaRPr lang="en-US" sz="1600" dirty="0"/>
+            </a:p>
+          </p:txBody>
+        </p:sp>
+      </p:grpSp>
+      <p:grpSp>
+        <p:nvGrpSpPr>
+          <p:cNvPr id="7" name="Group 6"/>
+          <p:cNvGrpSpPr/>
+          <p:nvPr/>
+        </p:nvGrpSpPr>
+        <p:grpSpPr>
+          <a:xfrm>
+            <a:off x="2895600" y="3706763"/>
+            <a:ext cx="8554623" cy="1973728"/>
+            <a:chOff x="11062129" y="1178969"/>
+            <a:chExt cx="5249648" cy="1211202"/>
+          </a:xfrm>
+        </p:grpSpPr>
+        <p:pic>
+          <p:nvPicPr>
+            <p:cNvPr id="8" name="Picture 2" descr="https://fbcdn-profile-a.akamaihd.net/hprofile-ak-xfa1/v/t1.0-1/p320x320/10438557_392459417574073_8020700183090881959_n.jpg?oh=3e0b4fe51b39309b376778260a873bc8&amp;oe=55B607A4&amp;__gda__=1433900077_fc05d5f6525cf149fc5477132b3592df"/>
+            <p:cNvPicPr>
+              <a:picLocks noChangeAspect="1" noChangeArrowheads="1"/>
+            </p:cNvPicPr>
+            <p:nvPr/>
+          </p:nvPicPr>
+          <p:blipFill>
+            <a:blip r:embed="rId2">
+              <a:extLst>
+                <a:ext uri="{28A0092B-C50C-407E-A947-70E740481C1C}">
+                  <a14:useLocalDpi xmlns:a14="http://schemas.microsoft.com/office/drawing/2010/main" val="0"/>
+                </a:ext>
+              </a:extLst>
+            </a:blip>
+            <a:srcRect/>
+            <a:stretch>
+              <a:fillRect/>
+            </a:stretch>
+          </p:blipFill>
+          <p:spPr bwMode="auto">
+            <a:xfrm>
+              <a:off x="11062129" y="1238785"/>
+              <a:ext cx="1151385" cy="1151386"/>
+            </a:xfrm>
+            <a:prstGeom prst="rect">
+              <a:avLst/>
+            </a:prstGeom>
+            <a:noFill/>
+            <a:extLst>
+              <a:ext uri="{909E8E84-426E-40DD-AFC4-6F175D3DCCD1}">
+                <a14:hiddenFill xmlns:a14="http://schemas.microsoft.com/office/drawing/2010/main">
+                  <a:solidFill>
+                    <a:srgbClr val="FFFFFF"/>
+                  </a:solidFill>
+                </a14:hiddenFill>
+              </a:ext>
+            </a:extLst>
+          </p:spPr>
+        </p:pic>
+        <p:sp>
+          <p:nvSpPr>
+            <p:cNvPr id="9" name="TextBox 8"/>
+            <p:cNvSpPr txBox="1"/>
+            <p:nvPr/>
+          </p:nvSpPr>
+          <p:spPr>
+            <a:xfrm>
+              <a:off x="12374478" y="1178969"/>
+              <a:ext cx="3937299" cy="925467"/>
+            </a:xfrm>
+            <a:prstGeom prst="rect">
+              <a:avLst/>
+            </a:prstGeom>
+            <a:noFill/>
+          </p:spPr>
+          <p:txBody>
+            <a:bodyPr wrap="square" rtlCol="0">
+              <a:spAutoFit/>
+            </a:bodyPr>
+            <a:lstStyle/>
+            <a:p>
+              <a:r>
+                <a:rPr lang="en-US" sz="2800" dirty="0" smtClean="0">
+                  <a:effectLst>
+                    <a:outerShdw blurRad="38100" dist="38100" dir="2700000" algn="tl">
+                      <a:srgbClr val="000000">
+                        <a:alpha val="43137"/>
+                      </a:srgbClr>
+                    </a:outerShdw>
+                  </a:effectLst>
+                </a:rPr>
+                <a:t>Sam</a:t>
+              </a:r>
+              <a:endParaRPr lang="en-US" sz="2800" dirty="0" smtClean="0">
+                <a:effectLst>
+                  <a:outerShdw blurRad="38100" dist="38100" dir="2700000" algn="tl">
+                    <a:srgbClr val="000000">
+                      <a:alpha val="43137"/>
+                    </a:srgbClr>
+                  </a:outerShdw>
+                </a:effectLst>
+              </a:endParaRPr>
+            </a:p>
+            <a:p>
+              <a:r>
+                <a:rPr lang="en-US" sz="1600" b="1" dirty="0" smtClean="0"/>
+                <a:t>Assistant Developer</a:t>
+              </a:r>
+              <a:endParaRPr lang="en-US" sz="1600" b="1" dirty="0" smtClean="0"/>
+            </a:p>
+            <a:p>
+              <a:r>
+                <a:rPr lang="en-US" sz="1600" dirty="0" smtClean="0"/>
+                <a:t>10</a:t>
+              </a:r>
+              <a:r>
+                <a:rPr lang="en-US" sz="1600" baseline="30000" dirty="0" smtClean="0"/>
+                <a:t>th</a:t>
+              </a:r>
+              <a:r>
+                <a:rPr lang="en-US" sz="1600" dirty="0" smtClean="0"/>
+                <a:t> Grade Student</a:t>
+              </a:r>
+            </a:p>
+            <a:p>
+              <a:r>
+                <a:rPr lang="en-US" sz="1600" dirty="0" smtClean="0"/>
+                <a:t>Mamaroneck </a:t>
+              </a:r>
+              <a:r>
+                <a:rPr lang="en-US" sz="1600" dirty="0" smtClean="0"/>
+                <a:t>High School</a:t>
+              </a:r>
+            </a:p>
+            <a:p>
+              <a:r>
+                <a:rPr lang="en-US" sz="1600" dirty="0" smtClean="0">
+                  <a:hlinkClick r:id="rId3"/>
+                </a:rPr>
+                <a:t>aakatz3@gmail.com</a:t>
+              </a:r>
+              <a:endParaRPr lang="en-US" sz="1600" dirty="0"/>
+            </a:p>
+          </p:txBody>
+        </p:sp>
+      </p:grpSp>
     </p:spTree>
     <p:extLst>
       <p:ext uri="{BB962C8B-B14F-4D97-AF65-F5344CB8AC3E}">
@@ -9984,7 +10423,197 @@
   <p:timing>
     <p:tnLst>
       <p:par>
-        <p:cTn id="1" dur="indefinite" restart="never" nodeType="tmRoot"/>
+        <p:cTn id="1" dur="indefinite" restart="never" nodeType="tmRoot">
+          <p:childTnLst>
+            <p:seq concurrent="1" nextAc="seek">
+              <p:cTn id="2" dur="indefinite" nodeType="mainSeq">
+                <p:childTnLst>
+                  <p:par>
+                    <p:cTn id="3" fill="hold">
+                      <p:stCondLst>
+                        <p:cond delay="indefinite"/>
+                        <p:cond evt="onBegin" delay="0">
+                          <p:tn val="2"/>
+                        </p:cond>
+                      </p:stCondLst>
+                      <p:childTnLst>
+                        <p:par>
+                          <p:cTn id="4" fill="hold">
+                            <p:stCondLst>
+                              <p:cond delay="0"/>
+                            </p:stCondLst>
+                            <p:childTnLst>
+                              <p:par>
+                                <p:cTn id="5" presetID="2" presetClass="entr" presetSubtype="8" fill="hold" nodeType="withEffect">
+                                  <p:stCondLst>
+                                    <p:cond delay="0"/>
+                                  </p:stCondLst>
+                                  <p:childTnLst>
+                                    <p:set>
+                                      <p:cBhvr>
+                                        <p:cTn id="6" dur="1" fill="hold">
+                                          <p:stCondLst>
+                                            <p:cond delay="0"/>
+                                          </p:stCondLst>
+                                        </p:cTn>
+                                        <p:tgtEl>
+                                          <p:spTgt spid="4"/>
+                                        </p:tgtEl>
+                                        <p:attrNameLst>
+                                          <p:attrName>style.visibility</p:attrName>
+                                        </p:attrNameLst>
+                                      </p:cBhvr>
+                                      <p:to>
+                                        <p:strVal val="visible"/>
+                                      </p:to>
+                                    </p:set>
+                                    <p:anim calcmode="lin" valueType="num">
+                                      <p:cBhvr additive="base">
+                                        <p:cTn id="7" dur="500" fill="hold"/>
+                                        <p:tgtEl>
+                                          <p:spTgt spid="4"/>
+                                        </p:tgtEl>
+                                        <p:attrNameLst>
+                                          <p:attrName>ppt_x</p:attrName>
+                                        </p:attrNameLst>
+                                      </p:cBhvr>
+                                      <p:tavLst>
+                                        <p:tav tm="0">
+                                          <p:val>
+                                            <p:strVal val="0-#ppt_w/2"/>
+                                          </p:val>
+                                        </p:tav>
+                                        <p:tav tm="100000">
+                                          <p:val>
+                                            <p:strVal val="#ppt_x"/>
+                                          </p:val>
+                                        </p:tav>
+                                      </p:tavLst>
+                                    </p:anim>
+                                    <p:anim calcmode="lin" valueType="num">
+                                      <p:cBhvr additive="base">
+                                        <p:cTn id="8" dur="500" fill="hold"/>
+                                        <p:tgtEl>
+                                          <p:spTgt spid="4"/>
+                                        </p:tgtEl>
+                                        <p:attrNameLst>
+                                          <p:attrName>ppt_y</p:attrName>
+                                        </p:attrNameLst>
+                                      </p:cBhvr>
+                                      <p:tavLst>
+                                        <p:tav tm="0">
+                                          <p:val>
+                                            <p:strVal val="#ppt_y"/>
+                                          </p:val>
+                                        </p:tav>
+                                        <p:tav tm="100000">
+                                          <p:val>
+                                            <p:strVal val="#ppt_y"/>
+                                          </p:val>
+                                        </p:tav>
+                                      </p:tavLst>
+                                    </p:anim>
+                                  </p:childTnLst>
+                                </p:cTn>
+                              </p:par>
+                              <p:par>
+                                <p:cTn id="9" presetID="2" presetClass="entr" presetSubtype="8" fill="hold" nodeType="withEffect">
+                                  <p:stCondLst>
+                                    <p:cond delay="0"/>
+                                  </p:stCondLst>
+                                  <p:childTnLst>
+                                    <p:set>
+                                      <p:cBhvr>
+                                        <p:cTn id="10" dur="1" fill="hold">
+                                          <p:stCondLst>
+                                            <p:cond delay="0"/>
+                                          </p:stCondLst>
+                                        </p:cTn>
+                                        <p:tgtEl>
+                                          <p:spTgt spid="7"/>
+                                        </p:tgtEl>
+                                        <p:attrNameLst>
+                                          <p:attrName>style.visibility</p:attrName>
+                                        </p:attrNameLst>
+                                      </p:cBhvr>
+                                      <p:to>
+                                        <p:strVal val="visible"/>
+                                      </p:to>
+                                    </p:set>
+                                    <p:anim calcmode="lin" valueType="num">
+                                      <p:cBhvr additive="base">
+                                        <p:cTn id="11" dur="500" fill="hold"/>
+                                        <p:tgtEl>
+                                          <p:spTgt spid="7"/>
+                                        </p:tgtEl>
+                                        <p:attrNameLst>
+                                          <p:attrName>ppt_x</p:attrName>
+                                        </p:attrNameLst>
+                                      </p:cBhvr>
+                                      <p:tavLst>
+                                        <p:tav tm="0">
+                                          <p:val>
+                                            <p:strVal val="0-#ppt_w/2"/>
+                                          </p:val>
+                                        </p:tav>
+                                        <p:tav tm="100000">
+                                          <p:val>
+                                            <p:strVal val="#ppt_x"/>
+                                          </p:val>
+                                        </p:tav>
+                                      </p:tavLst>
+                                    </p:anim>
+                                    <p:anim calcmode="lin" valueType="num">
+                                      <p:cBhvr additive="base">
+                                        <p:cTn id="12" dur="500" fill="hold"/>
+                                        <p:tgtEl>
+                                          <p:spTgt spid="7"/>
+                                        </p:tgtEl>
+                                        <p:attrNameLst>
+                                          <p:attrName>ppt_y</p:attrName>
+                                        </p:attrNameLst>
+                                      </p:cBhvr>
+                                      <p:tavLst>
+                                        <p:tav tm="0">
+                                          <p:val>
+                                            <p:strVal val="#ppt_y"/>
+                                          </p:val>
+                                        </p:tav>
+                                        <p:tav tm="100000">
+                                          <p:val>
+                                            <p:strVal val="#ppt_y"/>
+                                          </p:val>
+                                        </p:tav>
+                                      </p:tavLst>
+                                    </p:anim>
+                                  </p:childTnLst>
+                                </p:cTn>
+                              </p:par>
+                            </p:childTnLst>
+                          </p:cTn>
+                        </p:par>
+                      </p:childTnLst>
+                    </p:cTn>
+                  </p:par>
+                </p:childTnLst>
+              </p:cTn>
+              <p:prevCondLst>
+                <p:cond evt="onPrev" delay="0">
+                  <p:tgtEl>
+                    <p:sldTgt/>
+                  </p:tgtEl>
+                </p:cond>
+              </p:prevCondLst>
+              <p:nextCondLst>
+                <p:cond evt="onNext" delay="0">
+                  <p:tgtEl>
+                    <p:sldTgt/>
+                  </p:tgtEl>
+                </p:cond>
+              </p:nextCondLst>
+            </p:seq>
+          </p:childTnLst>
+        </p:cTn>
       </p:par>
     </p:tnLst>
   </p:timing>
@@ -10020,14 +10649,23 @@
         </p:nvSpPr>
         <p:spPr/>
         <p:txBody>
-          <a:bodyPr/>
+          <a:bodyPr>
+            <a:normAutofit fontScale="90000"/>
+          </a:bodyPr>
           <a:lstStyle/>
           <a:p>
             <a:r>
-              <a:rPr lang="en-US" dirty="0" smtClean="0"/>
-              <a:t>PROMPT HERE</a:t>
+              <a:rPr lang="en-US" dirty="0"/>
+              <a:t>Your school has asked you to write a mobile application announcing activities at your school including dates, times, and contact information. With this app include an events list that retrieves events starting at the current day and extending into the next few months. Include a banner image </a:t>
             </a:r>
-            <a:endParaRPr lang="en-US" dirty="0"/>
+            <a:r>
+              <a:rPr lang="en-US" dirty="0" err="1"/>
+              <a:t>scroller</a:t>
+            </a:r>
+            <a:r>
+              <a:rPr lang="en-US" dirty="0"/>
+              <a:t> to this application.</a:t>
+            </a:r>
           </a:p>
         </p:txBody>
       </p:sp>
@@ -10106,6 +10744,113 @@
 </file>
 
 <file path=ppt/slides/slide5.xml><?xml version="1.0" encoding="utf-8"?>
+<p:sld xmlns:a="http://schemas.openxmlformats.org/drawingml/2006/main" xmlns:r="http://schemas.openxmlformats.org/officeDocument/2006/relationships" xmlns:p="http://schemas.openxmlformats.org/presentationml/2006/main">
+  <p:cSld>
+    <p:spTree>
+      <p:nvGrpSpPr>
+        <p:cNvPr id="1" name=""/>
+        <p:cNvGrpSpPr/>
+        <p:nvPr/>
+      </p:nvGrpSpPr>
+      <p:grpSpPr>
+        <a:xfrm>
+          <a:off x="0" y="0"/>
+          <a:ext cx="0" cy="0"/>
+          <a:chOff x="0" y="0"/>
+          <a:chExt cx="0" cy="0"/>
+        </a:xfrm>
+      </p:grpSpPr>
+      <p:sp>
+        <p:nvSpPr>
+          <p:cNvPr id="5" name="Title 4"/>
+          <p:cNvSpPr>
+            <a:spLocks noGrp="1"/>
+          </p:cNvSpPr>
+          <p:nvPr>
+            <p:ph type="title"/>
+          </p:nvPr>
+        </p:nvSpPr>
+        <p:spPr/>
+        <p:txBody>
+          <a:bodyPr/>
+          <a:lstStyle/>
+          <a:p>
+            <a:r>
+              <a:rPr lang="en-US" dirty="0" smtClean="0"/>
+              <a:t>Our Solution</a:t>
+            </a:r>
+            <a:endParaRPr lang="en-US" dirty="0"/>
+          </a:p>
+        </p:txBody>
+      </p:sp>
+      <p:sp>
+        <p:nvSpPr>
+          <p:cNvPr id="6" name="Content Placeholder 5"/>
+          <p:cNvSpPr>
+            <a:spLocks noGrp="1"/>
+          </p:cNvSpPr>
+          <p:nvPr>
+            <p:ph idx="1"/>
+          </p:nvPr>
+        </p:nvSpPr>
+        <p:spPr/>
+        <p:txBody>
+          <a:bodyPr/>
+          <a:lstStyle/>
+          <a:p>
+            <a:r>
+              <a:rPr lang="en-US" dirty="0" smtClean="0"/>
+              <a:t>Our app’s icon is our school’s logo</a:t>
+            </a:r>
+          </a:p>
+          <a:p>
+            <a:r>
+              <a:rPr lang="en-US" dirty="0" smtClean="0"/>
+              <a:t>The front page of the app has a banner of images</a:t>
+            </a:r>
+          </a:p>
+          <a:p>
+            <a:r>
+              <a:rPr lang="en-US" dirty="0" smtClean="0"/>
+              <a:t>The front page has a list of events</a:t>
+            </a:r>
+          </a:p>
+          <a:p>
+            <a:r>
+              <a:rPr lang="en-US" dirty="0" smtClean="0"/>
+              <a:t>When an event is clicked on, it is brought up in more detail</a:t>
+            </a:r>
+          </a:p>
+          <a:p>
+            <a:r>
+              <a:rPr lang="en-US" dirty="0" smtClean="0"/>
+              <a:t>The detail view allows emailing the organizer (if available), sharing the event, and adding to calendar.</a:t>
+            </a:r>
+            <a:endParaRPr lang="en-US" dirty="0"/>
+          </a:p>
+        </p:txBody>
+      </p:sp>
+    </p:spTree>
+    <p:extLst>
+      <p:ext uri="{BB962C8B-B14F-4D97-AF65-F5344CB8AC3E}">
+        <p14:creationId xmlns:p14="http://schemas.microsoft.com/office/powerpoint/2010/main" val="4108874918"/>
+      </p:ext>
+    </p:extLst>
+  </p:cSld>
+  <p:clrMapOvr>
+    <a:masterClrMapping/>
+  </p:clrMapOvr>
+  <p:timing>
+    <p:tnLst>
+      <p:par>
+        <p:cTn id="1" dur="indefinite" restart="never" nodeType="tmRoot"/>
+      </p:par>
+    </p:tnLst>
+  </p:timing>
+</p:sld>
+</file>
+
+<file path=ppt/slides/slide6.xml><?xml version="1.0" encoding="utf-8"?>
 <p:sld xmlns:a="http://schemas.openxmlformats.org/drawingml/2006/main" xmlns:r="http://schemas.openxmlformats.org/officeDocument/2006/relationships" xmlns:p="http://schemas.openxmlformats.org/presentationml/2006/main">
   <p:cSld>
     <p:spTree>
@@ -10237,6 +10982,18 @@
   <p:clrMapOvr>
     <a:masterClrMapping/>
   </p:clrMapOvr>
+  <mc:AlternateContent xmlns:mc="http://schemas.openxmlformats.org/markup-compatibility/2006" xmlns:p14="http://schemas.microsoft.com/office/powerpoint/2010/main">
+    <mc:Choice Requires="p14">
+      <p:transition spd="slow" p14:dur="800">
+        <p14:flythrough/>
+      </p:transition>
+    </mc:Choice>
+    <mc:Fallback xmlns="">
+      <p:transition spd="slow">
+        <p:fade/>
+      </p:transition>
+    </mc:Fallback>
+  </mc:AlternateContent>
   <p:timing>
     <p:tnLst>
       <p:par>
@@ -10247,7 +11004,7 @@
 </p:sld>
 </file>
 
-<file path=ppt/slides/slide6.xml><?xml version="1.0" encoding="utf-8"?>
+<file path=ppt/slides/slide7.xml><?xml version="1.0" encoding="utf-8"?>
 <p:sld xmlns:a="http://schemas.openxmlformats.org/drawingml/2006/main" xmlns:r="http://schemas.openxmlformats.org/officeDocument/2006/relationships" xmlns:p="http://schemas.openxmlformats.org/presentationml/2006/main">
   <p:cSld>
     <p:spTree>
@@ -10320,8 +11077,8 @@
         </p:nvSpPr>
         <p:spPr>
           <a:xfrm>
-            <a:off x="11207647" y="2217173"/>
-            <a:ext cx="390221" cy="752169"/>
+            <a:off x="11207647" y="2219325"/>
+            <a:ext cx="390221" cy="745331"/>
           </a:xfrm>
           <a:prstGeom prst="rect">
             <a:avLst/>
@@ -10599,7 +11356,7 @@
 </p:sld>
 </file>
 
-<file path=ppt/slides/slide7.xml><?xml version="1.0" encoding="utf-8"?>
+<file path=ppt/slides/slide8.xml><?xml version="1.0" encoding="utf-8"?>
 <p:sld xmlns:a="http://schemas.openxmlformats.org/drawingml/2006/main" xmlns:r="http://schemas.openxmlformats.org/officeDocument/2006/relationships" xmlns:p="http://schemas.openxmlformats.org/presentationml/2006/main">
   <p:cSld>
     <p:spTree>
@@ -10944,107 +11701,22 @@
           <a:prstGeom prst="rect">
             <a:avLst/>
           </a:prstGeom>
+          <a:ln>
+            <a:noFill/>
+          </a:ln>
+          <a:effectLst>
+            <a:outerShdw blurRad="190500" algn="tl" rotWithShape="0">
+              <a:srgbClr val="000000">
+                <a:alpha val="70000"/>
+              </a:srgbClr>
+            </a:outerShdw>
+          </a:effectLst>
         </p:spPr>
       </p:pic>
     </p:spTree>
     <p:extLst>
       <p:ext uri="{BB962C8B-B14F-4D97-AF65-F5344CB8AC3E}">
         <p14:creationId xmlns:p14="http://schemas.microsoft.com/office/powerpoint/2010/main" val="1551164990"/>
-      </p:ext>
-    </p:extLst>
-  </p:cSld>
-  <p:clrMapOvr>
-    <a:masterClrMapping/>
-  </p:clrMapOvr>
-  <mc:AlternateContent xmlns:mc="http://schemas.openxmlformats.org/markup-compatibility/2006" xmlns:p14="http://schemas.microsoft.com/office/powerpoint/2010/main">
-    <mc:Choice Requires="p14">
-      <p:transition spd="slow" p14:dur="800">
-        <p14:flythrough/>
-      </p:transition>
-    </mc:Choice>
-    <mc:Fallback xmlns="">
-      <p:transition spd="slow">
-        <p:fade/>
-      </p:transition>
-    </mc:Fallback>
-  </mc:AlternateContent>
-  <p:timing>
-    <p:tnLst>
-      <p:par>
-        <p:cTn id="1" dur="indefinite" restart="never" nodeType="tmRoot"/>
-      </p:par>
-    </p:tnLst>
-  </p:timing>
-</p:sld>
-</file>
-
-<file path=ppt/slides/slide8.xml><?xml version="1.0" encoding="utf-8"?>
-<p:sld xmlns:a="http://schemas.openxmlformats.org/drawingml/2006/main" xmlns:r="http://schemas.openxmlformats.org/officeDocument/2006/relationships" xmlns:p="http://schemas.openxmlformats.org/presentationml/2006/main">
-  <p:cSld>
-    <p:spTree>
-      <p:nvGrpSpPr>
-        <p:cNvPr id="1" name=""/>
-        <p:cNvGrpSpPr/>
-        <p:nvPr/>
-      </p:nvGrpSpPr>
-      <p:grpSpPr>
-        <a:xfrm>
-          <a:off x="0" y="0"/>
-          <a:ext cx="0" cy="0"/>
-          <a:chOff x="0" y="0"/>
-          <a:chExt cx="0" cy="0"/>
-        </a:xfrm>
-      </p:grpSpPr>
-      <p:sp>
-        <p:nvSpPr>
-          <p:cNvPr id="2" name="Title 1"/>
-          <p:cNvSpPr>
-            <a:spLocks noGrp="1"/>
-          </p:cNvSpPr>
-          <p:nvPr>
-            <p:ph type="title"/>
-          </p:nvPr>
-        </p:nvSpPr>
-        <p:spPr/>
-        <p:txBody>
-          <a:bodyPr/>
-          <a:lstStyle/>
-          <a:p>
-            <a:r>
-              <a:rPr lang="en-US" dirty="0" smtClean="0"/>
-              <a:t>Screenshots</a:t>
-            </a:r>
-            <a:endParaRPr lang="en-US" dirty="0"/>
-          </a:p>
-        </p:txBody>
-      </p:sp>
-      <p:sp>
-        <p:nvSpPr>
-          <p:cNvPr id="3" name="Content Placeholder 2"/>
-          <p:cNvSpPr>
-            <a:spLocks noGrp="1"/>
-          </p:cNvSpPr>
-          <p:nvPr>
-            <p:ph idx="1"/>
-          </p:nvPr>
-        </p:nvSpPr>
-        <p:spPr/>
-        <p:txBody>
-          <a:bodyPr/>
-          <a:lstStyle/>
-          <a:p>
-            <a:r>
-              <a:rPr lang="en-US" dirty="0" smtClean="0"/>
-              <a:t>Layer the pictures here, use fast animations</a:t>
-            </a:r>
-            <a:endParaRPr lang="en-US" dirty="0"/>
-          </a:p>
-        </p:txBody>
-      </p:sp>
-    </p:spTree>
-    <p:extLst>
-      <p:ext uri="{BB962C8B-B14F-4D97-AF65-F5344CB8AC3E}">
-        <p14:creationId xmlns:p14="http://schemas.microsoft.com/office/powerpoint/2010/main" val="933352544"/>
       </p:ext>
     </p:extLst>
   </p:cSld>
@@ -11097,7 +11769,7 @@
             <a:spLocks noGrp="1"/>
           </p:cNvSpPr>
           <p:nvPr>
-            <p:ph type="ctrTitle"/>
+            <p:ph type="title"/>
           </p:nvPr>
         </p:nvSpPr>
         <p:spPr/>
@@ -11107,196 +11779,261 @@
           <a:p>
             <a:r>
               <a:rPr lang="en-US" dirty="0" smtClean="0"/>
-              <a:t>Live Demo</a:t>
+              <a:t>Screenshots</a:t>
             </a:r>
             <a:endParaRPr lang="en-US" dirty="0"/>
           </a:p>
         </p:txBody>
       </p:sp>
-      <p:sp>
-        <p:nvSpPr>
-          <p:cNvPr id="3" name="Subtitle 2"/>
-          <p:cNvSpPr>
-            <a:spLocks noGrp="1"/>
-          </p:cNvSpPr>
-          <p:nvPr>
-            <p:ph type="subTitle" idx="1"/>
-          </p:nvPr>
-        </p:nvSpPr>
-        <p:spPr/>
-        <p:txBody>
-          <a:bodyPr/>
-          <a:lstStyle/>
-          <a:p>
-            <a:r>
-              <a:rPr lang="en-US" dirty="0" smtClean="0"/>
-              <a:t>Please wait a few seconds while we switch the projector to the phone…</a:t>
-            </a:r>
-            <a:endParaRPr lang="en-US" dirty="0"/>
-          </a:p>
-        </p:txBody>
-      </p:sp>
-      <p:sp>
-        <p:nvSpPr>
-          <p:cNvPr id="4" name="Round Same Side Corner Rectangle 3"/>
-          <p:cNvSpPr/>
+      <p:pic>
+        <p:nvPicPr>
+          <p:cNvPr id="4" name="Picture 3"/>
+          <p:cNvPicPr>
+            <a:picLocks noChangeAspect="1"/>
+          </p:cNvPicPr>
           <p:nvPr/>
-        </p:nvSpPr>
+        </p:nvPicPr>
+        <p:blipFill>
+          <a:blip r:embed="rId2">
+            <a:extLst>
+              <a:ext uri="{28A0092B-C50C-407E-A947-70E740481C1C}">
+                <a14:useLocalDpi xmlns:a14="http://schemas.microsoft.com/office/drawing/2010/main" val="0"/>
+              </a:ext>
+            </a:extLst>
+          </a:blip>
+          <a:stretch>
+            <a:fillRect/>
+          </a:stretch>
+        </p:blipFill>
         <p:spPr>
           <a:xfrm>
-            <a:off x="1371600" y="5928852"/>
-            <a:ext cx="943897" cy="929148"/>
+            <a:off x="5579196" y="2905052"/>
+            <a:ext cx="1033607" cy="1047896"/>
           </a:xfrm>
-          <a:prstGeom prst="round2SameRect">
+          <a:prstGeom prst="rect">
             <a:avLst/>
           </a:prstGeom>
-          <a:solidFill>
-            <a:srgbClr val="FFFFFF">
-              <a:alpha val="70980"/>
-            </a:srgbClr>
-          </a:solidFill>
+        </p:spPr>
+      </p:pic>
+      <p:pic>
+        <p:nvPicPr>
+          <p:cNvPr id="5" name="Picture 4"/>
+          <p:cNvPicPr>
+            <a:picLocks noChangeAspect="1"/>
+          </p:cNvPicPr>
+          <p:nvPr/>
+        </p:nvPicPr>
+        <p:blipFill>
+          <a:blip r:embed="rId3">
+            <a:extLst>
+              <a:ext uri="{28A0092B-C50C-407E-A947-70E740481C1C}">
+                <a14:useLocalDpi xmlns:a14="http://schemas.microsoft.com/office/drawing/2010/main" val="0"/>
+              </a:ext>
+            </a:extLst>
+          </a:blip>
+          <a:stretch>
+            <a:fillRect/>
+          </a:stretch>
+        </p:blipFill>
+        <p:spPr>
+          <a:xfrm>
+            <a:off x="1869358" y="1019344"/>
+            <a:ext cx="2947834" cy="5240594"/>
+          </a:xfrm>
+          <a:prstGeom prst="rect">
+            <a:avLst/>
+          </a:prstGeom>
+        </p:spPr>
+      </p:pic>
+      <p:pic>
+        <p:nvPicPr>
+          <p:cNvPr id="6" name="Picture 5"/>
+          <p:cNvPicPr>
+            <a:picLocks noChangeAspect="1"/>
+          </p:cNvPicPr>
+          <p:nvPr/>
+        </p:nvPicPr>
+        <p:blipFill>
+          <a:blip r:embed="rId4">
+            <a:extLst>
+              <a:ext uri="{28A0092B-C50C-407E-A947-70E740481C1C}">
+                <a14:useLocalDpi xmlns:a14="http://schemas.microsoft.com/office/drawing/2010/main" val="0"/>
+              </a:ext>
+            </a:extLst>
+          </a:blip>
+          <a:stretch>
+            <a:fillRect/>
+          </a:stretch>
+        </p:blipFill>
+        <p:spPr>
+          <a:xfrm>
+            <a:off x="4950480" y="1874751"/>
+            <a:ext cx="6046901" cy="3401382"/>
+          </a:xfrm>
+          <a:prstGeom prst="rect">
+            <a:avLst/>
+          </a:prstGeom>
+        </p:spPr>
+      </p:pic>
+      <p:pic>
+        <p:nvPicPr>
+          <p:cNvPr id="11" name="Picture 10"/>
+          <p:cNvPicPr>
+            <a:picLocks noChangeAspect="1"/>
+          </p:cNvPicPr>
+          <p:nvPr/>
+        </p:nvPicPr>
+        <p:blipFill>
+          <a:blip r:embed="rId5">
+            <a:extLst>
+              <a:ext uri="{28A0092B-C50C-407E-A947-70E740481C1C}">
+                <a14:useLocalDpi xmlns:a14="http://schemas.microsoft.com/office/drawing/2010/main" val="0"/>
+              </a:ext>
+            </a:extLst>
+          </a:blip>
+          <a:stretch>
+            <a:fillRect/>
+          </a:stretch>
+        </p:blipFill>
+        <p:spPr>
+          <a:xfrm>
+            <a:off x="4933103" y="1874751"/>
+            <a:ext cx="6064278" cy="3411156"/>
+          </a:xfrm>
+          <a:prstGeom prst="rect">
+            <a:avLst/>
+          </a:prstGeom>
+        </p:spPr>
+      </p:pic>
+      <p:pic>
+        <p:nvPicPr>
+          <p:cNvPr id="13" name="Picture 12"/>
+          <p:cNvPicPr>
+            <a:picLocks noChangeAspect="1"/>
+          </p:cNvPicPr>
+          <p:nvPr/>
+        </p:nvPicPr>
+        <p:blipFill rotWithShape="1">
+          <a:blip r:embed="rId6">
+            <a:extLst>
+              <a:ext uri="{28A0092B-C50C-407E-A947-70E740481C1C}">
+                <a14:useLocalDpi xmlns:a14="http://schemas.microsoft.com/office/drawing/2010/main" val="0"/>
+              </a:ext>
+            </a:extLst>
+          </a:blip>
+          <a:srcRect l="4513" t="36253" r="3596" b="40201"/>
+          <a:stretch/>
+        </p:blipFill>
+        <p:spPr>
+          <a:xfrm>
+            <a:off x="4974719" y="613616"/>
+            <a:ext cx="2708787" cy="1233949"/>
+          </a:xfrm>
+          <a:prstGeom prst="rect">
+            <a:avLst/>
+          </a:prstGeom>
           <a:ln>
-            <a:solidFill>
-              <a:schemeClr val="bg1"/>
-            </a:solidFill>
+            <a:noFill/>
           </a:ln>
+          <a:effectLst>
+            <a:softEdge rad="112500"/>
+          </a:effectLst>
         </p:spPr>
-        <p:style>
-          <a:lnRef idx="2">
-            <a:schemeClr val="accent1">
-              <a:shade val="50000"/>
-            </a:schemeClr>
-          </a:lnRef>
-          <a:fillRef idx="1">
-            <a:schemeClr val="accent1"/>
-          </a:fillRef>
-          <a:effectRef idx="0">
-            <a:schemeClr val="accent1"/>
-          </a:effectRef>
-          <a:fontRef idx="minor">
-            <a:schemeClr val="lt1"/>
-          </a:fontRef>
-        </p:style>
-        <p:txBody>
-          <a:bodyPr rtlCol="0" anchor="ctr"/>
-          <a:lstStyle/>
-          <a:p>
-            <a:pPr algn="ctr"/>
-            <a:endParaRPr lang="en-US"/>
-          </a:p>
-        </p:txBody>
-      </p:sp>
-      <p:grpSp>
-        <p:nvGrpSpPr>
-          <p:cNvPr id="11" name="Group 10"/>
-          <p:cNvGrpSpPr/>
+      </p:pic>
+      <p:pic>
+        <p:nvPicPr>
+          <p:cNvPr id="9" name="Picture 8"/>
+          <p:cNvPicPr>
+            <a:picLocks noChangeAspect="1"/>
+          </p:cNvPicPr>
           <p:nvPr/>
-        </p:nvGrpSpPr>
-        <p:grpSpPr>
+        </p:nvPicPr>
+        <p:blipFill>
+          <a:blip r:embed="rId7">
+            <a:extLst>
+              <a:ext uri="{28A0092B-C50C-407E-A947-70E740481C1C}">
+                <a14:useLocalDpi xmlns:a14="http://schemas.microsoft.com/office/drawing/2010/main" val="0"/>
+              </a:ext>
+            </a:extLst>
+          </a:blip>
+          <a:stretch>
+            <a:fillRect/>
+          </a:stretch>
+        </p:blipFill>
+        <p:spPr>
           <a:xfrm>
-            <a:off x="1475143" y="6046521"/>
-            <a:ext cx="741816" cy="687605"/>
-            <a:chOff x="2801484" y="5197261"/>
-            <a:chExt cx="741816" cy="687605"/>
+            <a:off x="1869358" y="1019344"/>
+            <a:ext cx="2947834" cy="5240594"/>
           </a:xfrm>
-        </p:grpSpPr>
-        <p:sp>
-          <p:nvSpPr>
-            <p:cNvPr id="10" name="Rounded Rectangle 9"/>
-            <p:cNvSpPr/>
-            <p:nvPr/>
-          </p:nvSpPr>
-          <p:spPr>
-            <a:xfrm>
-              <a:off x="2801484" y="5197261"/>
-              <a:ext cx="741816" cy="687605"/>
-            </a:xfrm>
-            <a:prstGeom prst="roundRect">
-              <a:avLst/>
-            </a:prstGeom>
-          </p:spPr>
-          <p:style>
-            <a:lnRef idx="2">
-              <a:schemeClr val="accent1">
-                <a:shade val="50000"/>
-              </a:schemeClr>
-            </a:lnRef>
-            <a:fillRef idx="1">
-              <a:schemeClr val="accent1"/>
-            </a:fillRef>
-            <a:effectRef idx="0">
-              <a:schemeClr val="accent1"/>
-            </a:effectRef>
-            <a:fontRef idx="minor">
-              <a:schemeClr val="lt1"/>
-            </a:fontRef>
-          </p:style>
-          <p:txBody>
-            <a:bodyPr rtlCol="0" anchor="ctr"/>
-            <a:lstStyle/>
-            <a:p>
-              <a:pPr algn="ctr"/>
-              <a:endParaRPr lang="en-US"/>
-            </a:p>
-          </p:txBody>
-        </p:sp>
-        <p:sp>
-          <p:nvSpPr>
-            <p:cNvPr id="9" name="Action Button: Movie 8">
-              <a:hlinkClick r:id="rId2" action="ppaction://hlinksldjump" highlightClick="1"/>
-            </p:cNvPr>
-            <p:cNvSpPr/>
-            <p:nvPr/>
-          </p:nvSpPr>
-          <p:spPr>
-            <a:xfrm>
-              <a:off x="2801485" y="5197261"/>
-              <a:ext cx="741815" cy="687605"/>
-            </a:xfrm>
-            <a:prstGeom prst="actionButtonMovie">
-              <a:avLst/>
-            </a:prstGeom>
-            <a:solidFill>
-              <a:srgbClr val="B2B2B2">
-                <a:alpha val="20000"/>
-              </a:srgbClr>
-            </a:solidFill>
-            <a:ln>
-              <a:solidFill>
-                <a:srgbClr val="FFFFFF"/>
-              </a:solidFill>
-            </a:ln>
-          </p:spPr>
-          <p:style>
-            <a:lnRef idx="2">
-              <a:schemeClr val="accent1">
-                <a:shade val="50000"/>
-              </a:schemeClr>
-            </a:lnRef>
-            <a:fillRef idx="1">
-              <a:schemeClr val="accent1"/>
-            </a:fillRef>
-            <a:effectRef idx="0">
-              <a:schemeClr val="accent1"/>
-            </a:effectRef>
-            <a:fontRef idx="minor">
-              <a:schemeClr val="lt1"/>
-            </a:fontRef>
-          </p:style>
-          <p:txBody>
-            <a:bodyPr rtlCol="0" anchor="ctr"/>
-            <a:lstStyle/>
-            <a:p>
-              <a:pPr algn="ctr"/>
-              <a:endParaRPr lang="en-US"/>
-            </a:p>
-          </p:txBody>
-        </p:sp>
-      </p:grpSp>
+          <a:prstGeom prst="rect">
+            <a:avLst/>
+          </a:prstGeom>
+        </p:spPr>
+      </p:pic>
+      <p:pic>
+        <p:nvPicPr>
+          <p:cNvPr id="12" name="Picture 11"/>
+          <p:cNvPicPr>
+            <a:picLocks noChangeAspect="1"/>
+          </p:cNvPicPr>
+          <p:nvPr/>
+        </p:nvPicPr>
+        <p:blipFill>
+          <a:blip r:embed="rId8">
+            <a:extLst>
+              <a:ext uri="{28A0092B-C50C-407E-A947-70E740481C1C}">
+                <a14:useLocalDpi xmlns:a14="http://schemas.microsoft.com/office/drawing/2010/main" val="0"/>
+              </a:ext>
+            </a:extLst>
+          </a:blip>
+          <a:stretch>
+            <a:fillRect/>
+          </a:stretch>
+        </p:blipFill>
+        <p:spPr>
+          <a:xfrm>
+            <a:off x="1869358" y="1011008"/>
+            <a:ext cx="2957212" cy="5257265"/>
+          </a:xfrm>
+          <a:prstGeom prst="rect">
+            <a:avLst/>
+          </a:prstGeom>
+        </p:spPr>
+      </p:pic>
+      <p:pic>
+        <p:nvPicPr>
+          <p:cNvPr id="10" name="Picture 9"/>
+          <p:cNvPicPr>
+            <a:picLocks noChangeAspect="1"/>
+          </p:cNvPicPr>
+          <p:nvPr/>
+        </p:nvPicPr>
+        <p:blipFill>
+          <a:blip r:embed="rId9">
+            <a:extLst>
+              <a:ext uri="{28A0092B-C50C-407E-A947-70E740481C1C}">
+                <a14:useLocalDpi xmlns:a14="http://schemas.microsoft.com/office/drawing/2010/main" val="0"/>
+              </a:ext>
+            </a:extLst>
+          </a:blip>
+          <a:stretch>
+            <a:fillRect/>
+          </a:stretch>
+        </p:blipFill>
+        <p:spPr>
+          <a:xfrm>
+            <a:off x="4950481" y="1874751"/>
+            <a:ext cx="6046900" cy="3401382"/>
+          </a:xfrm>
+          <a:prstGeom prst="rect">
+            <a:avLst/>
+          </a:prstGeom>
+        </p:spPr>
+      </p:pic>
     </p:spTree>
     <p:extLst>
       <p:ext uri="{BB962C8B-B14F-4D97-AF65-F5344CB8AC3E}">
-        <p14:creationId xmlns:p14="http://schemas.microsoft.com/office/powerpoint/2010/main" val="1882097811"/>
+        <p14:creationId xmlns:p14="http://schemas.microsoft.com/office/powerpoint/2010/main" val="933352544"/>
       </p:ext>
     </p:extLst>
   </p:cSld>
@@ -11305,8 +12042,8 @@
   </p:clrMapOvr>
   <mc:AlternateContent xmlns:mc="http://schemas.openxmlformats.org/markup-compatibility/2006" xmlns:p14="http://schemas.microsoft.com/office/powerpoint/2010/main">
     <mc:Choice Requires="p14">
-      <p:transition spd="slow" p14:dur="1500">
-        <p14:reveal/>
+      <p:transition spd="slow" p14:dur="800">
+        <p14:flythrough/>
       </p:transition>
     </mc:Choice>
     <mc:Fallback xmlns="">
@@ -11318,7 +12055,438 @@
   <p:timing>
     <p:tnLst>
       <p:par>
-        <p:cTn id="1" dur="indefinite" restart="never" nodeType="tmRoot"/>
+        <p:cTn id="1" dur="indefinite" restart="never" nodeType="tmRoot">
+          <p:childTnLst>
+            <p:seq concurrent="1" nextAc="seek">
+              <p:cTn id="2" dur="indefinite" nodeType="mainSeq">
+                <p:childTnLst>
+                  <p:par>
+                    <p:cTn id="3" fill="hold">
+                      <p:stCondLst>
+                        <p:cond delay="indefinite"/>
+                        <p:cond evt="onBegin" delay="0">
+                          <p:tn val="2"/>
+                        </p:cond>
+                      </p:stCondLst>
+                      <p:childTnLst>
+                        <p:par>
+                          <p:cTn id="4" fill="hold">
+                            <p:stCondLst>
+                              <p:cond delay="0"/>
+                            </p:stCondLst>
+                            <p:childTnLst>
+                              <p:par>
+                                <p:cTn id="5" presetID="10" presetClass="entr" presetSubtype="0" fill="hold" nodeType="afterEffect">
+                                  <p:stCondLst>
+                                    <p:cond delay="0"/>
+                                  </p:stCondLst>
+                                  <p:childTnLst>
+                                    <p:set>
+                                      <p:cBhvr>
+                                        <p:cTn id="6" dur="1" fill="hold">
+                                          <p:stCondLst>
+                                            <p:cond delay="0"/>
+                                          </p:stCondLst>
+                                        </p:cTn>
+                                        <p:tgtEl>
+                                          <p:spTgt spid="4"/>
+                                        </p:tgtEl>
+                                        <p:attrNameLst>
+                                          <p:attrName>style.visibility</p:attrName>
+                                        </p:attrNameLst>
+                                      </p:cBhvr>
+                                      <p:to>
+                                        <p:strVal val="visible"/>
+                                      </p:to>
+                                    </p:set>
+                                    <p:animEffect transition="in" filter="fade">
+                                      <p:cBhvr>
+                                        <p:cTn id="7" dur="500"/>
+                                        <p:tgtEl>
+                                          <p:spTgt spid="4"/>
+                                        </p:tgtEl>
+                                      </p:cBhvr>
+                                    </p:animEffect>
+                                  </p:childTnLst>
+                                </p:cTn>
+                              </p:par>
+                            </p:childTnLst>
+                          </p:cTn>
+                        </p:par>
+                      </p:childTnLst>
+                    </p:cTn>
+                  </p:par>
+                  <p:par>
+                    <p:cTn id="8" fill="hold">
+                      <p:stCondLst>
+                        <p:cond delay="indefinite"/>
+                      </p:stCondLst>
+                      <p:childTnLst>
+                        <p:par>
+                          <p:cTn id="9" fill="hold">
+                            <p:stCondLst>
+                              <p:cond delay="0"/>
+                            </p:stCondLst>
+                            <p:childTnLst>
+                              <p:par>
+                                <p:cTn id="10" presetID="10" presetClass="entr" presetSubtype="0" fill="hold" nodeType="clickEffect">
+                                  <p:stCondLst>
+                                    <p:cond delay="0"/>
+                                  </p:stCondLst>
+                                  <p:childTnLst>
+                                    <p:set>
+                                      <p:cBhvr>
+                                        <p:cTn id="11" dur="1" fill="hold">
+                                          <p:stCondLst>
+                                            <p:cond delay="0"/>
+                                          </p:stCondLst>
+                                        </p:cTn>
+                                        <p:tgtEl>
+                                          <p:spTgt spid="5"/>
+                                        </p:tgtEl>
+                                        <p:attrNameLst>
+                                          <p:attrName>style.visibility</p:attrName>
+                                        </p:attrNameLst>
+                                      </p:cBhvr>
+                                      <p:to>
+                                        <p:strVal val="visible"/>
+                                      </p:to>
+                                    </p:set>
+                                    <p:animEffect transition="in" filter="fade">
+                                      <p:cBhvr>
+                                        <p:cTn id="12" dur="500"/>
+                                        <p:tgtEl>
+                                          <p:spTgt spid="5"/>
+                                        </p:tgtEl>
+                                      </p:cBhvr>
+                                    </p:animEffect>
+                                  </p:childTnLst>
+                                </p:cTn>
+                              </p:par>
+                              <p:par>
+                                <p:cTn id="13" presetID="10" presetClass="entr" presetSubtype="0" fill="hold" nodeType="withEffect">
+                                  <p:stCondLst>
+                                    <p:cond delay="0"/>
+                                  </p:stCondLst>
+                                  <p:childTnLst>
+                                    <p:set>
+                                      <p:cBhvr>
+                                        <p:cTn id="14" dur="1" fill="hold">
+                                          <p:stCondLst>
+                                            <p:cond delay="0"/>
+                                          </p:stCondLst>
+                                        </p:cTn>
+                                        <p:tgtEl>
+                                          <p:spTgt spid="6"/>
+                                        </p:tgtEl>
+                                        <p:attrNameLst>
+                                          <p:attrName>style.visibility</p:attrName>
+                                        </p:attrNameLst>
+                                      </p:cBhvr>
+                                      <p:to>
+                                        <p:strVal val="visible"/>
+                                      </p:to>
+                                    </p:set>
+                                    <p:animEffect transition="in" filter="fade">
+                                      <p:cBhvr>
+                                        <p:cTn id="15" dur="500"/>
+                                        <p:tgtEl>
+                                          <p:spTgt spid="6"/>
+                                        </p:tgtEl>
+                                      </p:cBhvr>
+                                    </p:animEffect>
+                                  </p:childTnLst>
+                                </p:cTn>
+                              </p:par>
+                            </p:childTnLst>
+                          </p:cTn>
+                        </p:par>
+                      </p:childTnLst>
+                    </p:cTn>
+                  </p:par>
+                  <p:par>
+                    <p:cTn id="16" fill="hold">
+                      <p:stCondLst>
+                        <p:cond delay="indefinite"/>
+                      </p:stCondLst>
+                      <p:childTnLst>
+                        <p:par>
+                          <p:cTn id="17" fill="hold">
+                            <p:stCondLst>
+                              <p:cond delay="0"/>
+                            </p:stCondLst>
+                            <p:childTnLst>
+                              <p:par>
+                                <p:cTn id="18" presetID="10" presetClass="entr" presetSubtype="0" fill="hold" nodeType="clickEffect">
+                                  <p:stCondLst>
+                                    <p:cond delay="0"/>
+                                  </p:stCondLst>
+                                  <p:childTnLst>
+                                    <p:set>
+                                      <p:cBhvr>
+                                        <p:cTn id="19" dur="1" fill="hold">
+                                          <p:stCondLst>
+                                            <p:cond delay="0"/>
+                                          </p:stCondLst>
+                                        </p:cTn>
+                                        <p:tgtEl>
+                                          <p:spTgt spid="13"/>
+                                        </p:tgtEl>
+                                        <p:attrNameLst>
+                                          <p:attrName>style.visibility</p:attrName>
+                                        </p:attrNameLst>
+                                      </p:cBhvr>
+                                      <p:to>
+                                        <p:strVal val="visible"/>
+                                      </p:to>
+                                    </p:set>
+                                    <p:animEffect transition="in" filter="fade">
+                                      <p:cBhvr>
+                                        <p:cTn id="20" dur="500"/>
+                                        <p:tgtEl>
+                                          <p:spTgt spid="13"/>
+                                        </p:tgtEl>
+                                      </p:cBhvr>
+                                    </p:animEffect>
+                                  </p:childTnLst>
+                                </p:cTn>
+                              </p:par>
+                            </p:childTnLst>
+                          </p:cTn>
+                        </p:par>
+                      </p:childTnLst>
+                    </p:cTn>
+                  </p:par>
+                  <p:par>
+                    <p:cTn id="21" fill="hold">
+                      <p:stCondLst>
+                        <p:cond delay="indefinite"/>
+                      </p:stCondLst>
+                      <p:childTnLst>
+                        <p:par>
+                          <p:cTn id="22" fill="hold">
+                            <p:stCondLst>
+                              <p:cond delay="0"/>
+                            </p:stCondLst>
+                            <p:childTnLst>
+                              <p:par>
+                                <p:cTn id="23" presetID="10" presetClass="exit" presetSubtype="0" fill="hold" nodeType="clickEffect">
+                                  <p:stCondLst>
+                                    <p:cond delay="0"/>
+                                  </p:stCondLst>
+                                  <p:childTnLst>
+                                    <p:animEffect transition="out" filter="fade">
+                                      <p:cBhvr>
+                                        <p:cTn id="24" dur="500"/>
+                                        <p:tgtEl>
+                                          <p:spTgt spid="13"/>
+                                        </p:tgtEl>
+                                      </p:cBhvr>
+                                    </p:animEffect>
+                                    <p:set>
+                                      <p:cBhvr>
+                                        <p:cTn id="25" dur="1" fill="hold">
+                                          <p:stCondLst>
+                                            <p:cond delay="499"/>
+                                          </p:stCondLst>
+                                        </p:cTn>
+                                        <p:tgtEl>
+                                          <p:spTgt spid="13"/>
+                                        </p:tgtEl>
+                                        <p:attrNameLst>
+                                          <p:attrName>style.visibility</p:attrName>
+                                        </p:attrNameLst>
+                                      </p:cBhvr>
+                                      <p:to>
+                                        <p:strVal val="hidden"/>
+                                      </p:to>
+                                    </p:set>
+                                  </p:childTnLst>
+                                </p:cTn>
+                              </p:par>
+                              <p:par>
+                                <p:cTn id="26" presetID="10" presetClass="entr" presetSubtype="0" fill="hold" nodeType="withEffect">
+                                  <p:stCondLst>
+                                    <p:cond delay="0"/>
+                                  </p:stCondLst>
+                                  <p:childTnLst>
+                                    <p:set>
+                                      <p:cBhvr>
+                                        <p:cTn id="27" dur="1" fill="hold">
+                                          <p:stCondLst>
+                                            <p:cond delay="0"/>
+                                          </p:stCondLst>
+                                        </p:cTn>
+                                        <p:tgtEl>
+                                          <p:spTgt spid="11"/>
+                                        </p:tgtEl>
+                                        <p:attrNameLst>
+                                          <p:attrName>style.visibility</p:attrName>
+                                        </p:attrNameLst>
+                                      </p:cBhvr>
+                                      <p:to>
+                                        <p:strVal val="visible"/>
+                                      </p:to>
+                                    </p:set>
+                                    <p:animEffect transition="in" filter="fade">
+                                      <p:cBhvr>
+                                        <p:cTn id="28" dur="500"/>
+                                        <p:tgtEl>
+                                          <p:spTgt spid="11"/>
+                                        </p:tgtEl>
+                                      </p:cBhvr>
+                                    </p:animEffect>
+                                  </p:childTnLst>
+                                </p:cTn>
+                              </p:par>
+                              <p:par>
+                                <p:cTn id="29" presetID="10" presetClass="entr" presetSubtype="0" fill="hold" nodeType="withEffect">
+                                  <p:stCondLst>
+                                    <p:cond delay="0"/>
+                                  </p:stCondLst>
+                                  <p:childTnLst>
+                                    <p:set>
+                                      <p:cBhvr>
+                                        <p:cTn id="30" dur="1" fill="hold">
+                                          <p:stCondLst>
+                                            <p:cond delay="0"/>
+                                          </p:stCondLst>
+                                        </p:cTn>
+                                        <p:tgtEl>
+                                          <p:spTgt spid="9"/>
+                                        </p:tgtEl>
+                                        <p:attrNameLst>
+                                          <p:attrName>style.visibility</p:attrName>
+                                        </p:attrNameLst>
+                                      </p:cBhvr>
+                                      <p:to>
+                                        <p:strVal val="visible"/>
+                                      </p:to>
+                                    </p:set>
+                                    <p:animEffect transition="in" filter="fade">
+                                      <p:cBhvr>
+                                        <p:cTn id="31" dur="500"/>
+                                        <p:tgtEl>
+                                          <p:spTgt spid="9"/>
+                                        </p:tgtEl>
+                                      </p:cBhvr>
+                                    </p:animEffect>
+                                  </p:childTnLst>
+                                </p:cTn>
+                              </p:par>
+                            </p:childTnLst>
+                          </p:cTn>
+                        </p:par>
+                      </p:childTnLst>
+                    </p:cTn>
+                  </p:par>
+                  <p:par>
+                    <p:cTn id="32" fill="hold">
+                      <p:stCondLst>
+                        <p:cond delay="indefinite"/>
+                      </p:stCondLst>
+                      <p:childTnLst>
+                        <p:par>
+                          <p:cTn id="33" fill="hold">
+                            <p:stCondLst>
+                              <p:cond delay="0"/>
+                            </p:stCondLst>
+                            <p:childTnLst>
+                              <p:par>
+                                <p:cTn id="34" presetID="10" presetClass="entr" presetSubtype="0" fill="hold" nodeType="clickEffect">
+                                  <p:stCondLst>
+                                    <p:cond delay="0"/>
+                                  </p:stCondLst>
+                                  <p:childTnLst>
+                                    <p:set>
+                                      <p:cBhvr>
+                                        <p:cTn id="35" dur="1" fill="hold">
+                                          <p:stCondLst>
+                                            <p:cond delay="0"/>
+                                          </p:stCondLst>
+                                        </p:cTn>
+                                        <p:tgtEl>
+                                          <p:spTgt spid="12"/>
+                                        </p:tgtEl>
+                                        <p:attrNameLst>
+                                          <p:attrName>style.visibility</p:attrName>
+                                        </p:attrNameLst>
+                                      </p:cBhvr>
+                                      <p:to>
+                                        <p:strVal val="visible"/>
+                                      </p:to>
+                                    </p:set>
+                                    <p:animEffect transition="in" filter="fade">
+                                      <p:cBhvr>
+                                        <p:cTn id="36" dur="500"/>
+                                        <p:tgtEl>
+                                          <p:spTgt spid="12"/>
+                                        </p:tgtEl>
+                                      </p:cBhvr>
+                                    </p:animEffect>
+                                  </p:childTnLst>
+                                </p:cTn>
+                              </p:par>
+                              <p:par>
+                                <p:cTn id="37" presetID="10" presetClass="entr" presetSubtype="0" fill="hold" nodeType="withEffect">
+                                  <p:stCondLst>
+                                    <p:cond delay="0"/>
+                                  </p:stCondLst>
+                                  <p:childTnLst>
+                                    <p:set>
+                                      <p:cBhvr>
+                                        <p:cTn id="38" dur="1" fill="hold">
+                                          <p:stCondLst>
+                                            <p:cond delay="0"/>
+                                          </p:stCondLst>
+                                        </p:cTn>
+                                        <p:tgtEl>
+                                          <p:spTgt spid="10"/>
+                                        </p:tgtEl>
+                                        <p:attrNameLst>
+                                          <p:attrName>style.visibility</p:attrName>
+                                        </p:attrNameLst>
+                                      </p:cBhvr>
+                                      <p:to>
+                                        <p:strVal val="visible"/>
+                                      </p:to>
+                                    </p:set>
+                                    <p:animEffect transition="in" filter="fade">
+                                      <p:cBhvr>
+                                        <p:cTn id="39" dur="500"/>
+                                        <p:tgtEl>
+                                          <p:spTgt spid="10"/>
+                                        </p:tgtEl>
+                                      </p:cBhvr>
+                                    </p:animEffect>
+                                  </p:childTnLst>
+                                </p:cTn>
+                              </p:par>
+                            </p:childTnLst>
+                          </p:cTn>
+                        </p:par>
+                      </p:childTnLst>
+                    </p:cTn>
+                  </p:par>
+                </p:childTnLst>
+              </p:cTn>
+              <p:prevCondLst>
+                <p:cond evt="onPrev" delay="0">
+                  <p:tgtEl>
+                    <p:sldTgt/>
+                  </p:tgtEl>
+                </p:cond>
+              </p:prevCondLst>
+              <p:nextCondLst>
+                <p:cond evt="onNext" delay="0">
+                  <p:tgtEl>
+                    <p:sldTgt/>
+                  </p:tgtEl>
+                </p:cond>
+              </p:nextCondLst>
+            </p:seq>
+          </p:childTnLst>
+        </p:cTn>
       </p:par>
     </p:tnLst>
   </p:timing>

</xml_diff>